<commit_message>
Small modification on logo
</commit_message>
<xml_diff>
--- a/resources/base logo.pptx
+++ b/resources/base logo.pptx
@@ -5,19 +5,20 @@
     <p:sldMasterId id="2147483648" r:id="rId1"/>
   </p:sldMasterIdLst>
   <p:notesMasterIdLst>
-    <p:notesMasterId r:id="rId12"/>
+    <p:notesMasterId r:id="rId13"/>
   </p:notesMasterIdLst>
   <p:sldIdLst>
     <p:sldId id="286" r:id="rId2"/>
     <p:sldId id="288" r:id="rId3"/>
-    <p:sldId id="289" r:id="rId4"/>
-    <p:sldId id="287" r:id="rId5"/>
-    <p:sldId id="278" r:id="rId6"/>
-    <p:sldId id="285" r:id="rId7"/>
-    <p:sldId id="281" r:id="rId8"/>
-    <p:sldId id="283" r:id="rId9"/>
-    <p:sldId id="284" r:id="rId10"/>
-    <p:sldId id="280" r:id="rId11"/>
+    <p:sldId id="291" r:id="rId4"/>
+    <p:sldId id="289" r:id="rId5"/>
+    <p:sldId id="287" r:id="rId6"/>
+    <p:sldId id="278" r:id="rId7"/>
+    <p:sldId id="285" r:id="rId8"/>
+    <p:sldId id="281" r:id="rId9"/>
+    <p:sldId id="283" r:id="rId10"/>
+    <p:sldId id="284" r:id="rId11"/>
+    <p:sldId id="280" r:id="rId12"/>
   </p:sldIdLst>
   <p:sldSz cx="12192000" cy="6858000"/>
   <p:notesSz cx="6858000" cy="9144000"/>
@@ -4130,6 +4131,262 @@
       </p:grpSpPr>
       <p:grpSp>
         <p:nvGrpSpPr>
+          <p:cNvPr id="9" name="Group 8">
+            <a:extLst>
+              <a:ext uri="{FF2B5EF4-FFF2-40B4-BE49-F238E27FC236}">
+                <a16:creationId xmlns:a16="http://schemas.microsoft.com/office/drawing/2014/main" id="{2590A2DE-16F5-44B0-79F7-D9518568AB64}"/>
+              </a:ext>
+            </a:extLst>
+          </p:cNvPr>
+          <p:cNvGrpSpPr/>
+          <p:nvPr/>
+        </p:nvGrpSpPr>
+        <p:grpSpPr>
+          <a:xfrm>
+            <a:off x="4468368" y="1625169"/>
+            <a:ext cx="3959748" cy="1566088"/>
+            <a:chOff x="4468368" y="1563624"/>
+            <a:chExt cx="4531517" cy="1792224"/>
+          </a:xfrm>
+        </p:grpSpPr>
+        <p:sp>
+          <p:nvSpPr>
+            <p:cNvPr id="6" name="Rectangle 5">
+              <a:extLst>
+                <a:ext uri="{FF2B5EF4-FFF2-40B4-BE49-F238E27FC236}">
+                  <a16:creationId xmlns:a16="http://schemas.microsoft.com/office/drawing/2014/main" id="{011E5DD6-E9CE-0E04-DAAC-92581C64AEF3}"/>
+                </a:ext>
+              </a:extLst>
+            </p:cNvPr>
+            <p:cNvSpPr/>
+            <p:nvPr/>
+          </p:nvSpPr>
+          <p:spPr>
+            <a:xfrm>
+              <a:off x="4468368" y="2990088"/>
+              <a:ext cx="1627632" cy="365760"/>
+            </a:xfrm>
+            <a:prstGeom prst="rect">
+              <a:avLst/>
+            </a:prstGeom>
+            <a:solidFill>
+              <a:srgbClr val="1A1F71"/>
+            </a:solidFill>
+            <a:ln>
+              <a:noFill/>
+            </a:ln>
+          </p:spPr>
+          <p:style>
+            <a:lnRef idx="2">
+              <a:schemeClr val="accent1">
+                <a:shade val="15000"/>
+              </a:schemeClr>
+            </a:lnRef>
+            <a:fillRef idx="1">
+              <a:schemeClr val="accent1"/>
+            </a:fillRef>
+            <a:effectRef idx="0">
+              <a:schemeClr val="accent1"/>
+            </a:effectRef>
+            <a:fontRef idx="minor">
+              <a:schemeClr val="lt1"/>
+            </a:fontRef>
+          </p:style>
+          <p:txBody>
+            <a:bodyPr rtlCol="0" anchor="ctr"/>
+            <a:lstStyle/>
+            <a:p>
+              <a:pPr algn="ctr"/>
+              <a:endParaRPr lang="en-150"/>
+            </a:p>
+          </p:txBody>
+        </p:sp>
+        <p:sp>
+          <p:nvSpPr>
+            <p:cNvPr id="7" name="Rectangle 6">
+              <a:extLst>
+                <a:ext uri="{FF2B5EF4-FFF2-40B4-BE49-F238E27FC236}">
+                  <a16:creationId xmlns:a16="http://schemas.microsoft.com/office/drawing/2014/main" id="{4E011A50-3FA0-A8E8-8DF5-1CBB2DF4C4FE}"/>
+                </a:ext>
+              </a:extLst>
+            </p:cNvPr>
+            <p:cNvSpPr/>
+            <p:nvPr/>
+          </p:nvSpPr>
+          <p:spPr>
+            <a:xfrm>
+              <a:off x="5920312" y="2276856"/>
+              <a:ext cx="1627632" cy="365760"/>
+            </a:xfrm>
+            <a:prstGeom prst="rect">
+              <a:avLst/>
+            </a:prstGeom>
+            <a:solidFill>
+              <a:srgbClr val="1A1F71"/>
+            </a:solidFill>
+            <a:ln>
+              <a:noFill/>
+            </a:ln>
+          </p:spPr>
+          <p:style>
+            <a:lnRef idx="2">
+              <a:schemeClr val="accent1">
+                <a:shade val="15000"/>
+              </a:schemeClr>
+            </a:lnRef>
+            <a:fillRef idx="1">
+              <a:schemeClr val="accent1"/>
+            </a:fillRef>
+            <a:effectRef idx="0">
+              <a:schemeClr val="accent1"/>
+            </a:effectRef>
+            <a:fontRef idx="minor">
+              <a:schemeClr val="lt1"/>
+            </a:fontRef>
+          </p:style>
+          <p:txBody>
+            <a:bodyPr rtlCol="0" anchor="ctr"/>
+            <a:lstStyle/>
+            <a:p>
+              <a:pPr algn="ctr"/>
+              <a:endParaRPr lang="en-150"/>
+            </a:p>
+          </p:txBody>
+        </p:sp>
+        <p:sp>
+          <p:nvSpPr>
+            <p:cNvPr id="8" name="Rectangle 7">
+              <a:extLst>
+                <a:ext uri="{FF2B5EF4-FFF2-40B4-BE49-F238E27FC236}">
+                  <a16:creationId xmlns:a16="http://schemas.microsoft.com/office/drawing/2014/main" id="{78B4BDD1-236D-438B-09EB-97CA895C3300}"/>
+                </a:ext>
+              </a:extLst>
+            </p:cNvPr>
+            <p:cNvSpPr/>
+            <p:nvPr/>
+          </p:nvSpPr>
+          <p:spPr>
+            <a:xfrm>
+              <a:off x="7372256" y="1563624"/>
+              <a:ext cx="1627629" cy="365760"/>
+            </a:xfrm>
+            <a:prstGeom prst="rect">
+              <a:avLst/>
+            </a:prstGeom>
+            <a:solidFill>
+              <a:srgbClr val="FFD700"/>
+            </a:solidFill>
+            <a:ln>
+              <a:noFill/>
+            </a:ln>
+          </p:spPr>
+          <p:style>
+            <a:lnRef idx="2">
+              <a:schemeClr val="accent1">
+                <a:shade val="15000"/>
+              </a:schemeClr>
+            </a:lnRef>
+            <a:fillRef idx="1">
+              <a:schemeClr val="accent1"/>
+            </a:fillRef>
+            <a:effectRef idx="0">
+              <a:schemeClr val="accent1"/>
+            </a:effectRef>
+            <a:fontRef idx="minor">
+              <a:schemeClr val="lt1"/>
+            </a:fontRef>
+          </p:style>
+          <p:txBody>
+            <a:bodyPr rtlCol="0" anchor="ctr"/>
+            <a:lstStyle/>
+            <a:p>
+              <a:pPr algn="ctr"/>
+              <a:endParaRPr lang="en-150"/>
+            </a:p>
+          </p:txBody>
+        </p:sp>
+      </p:grpSp>
+      <p:sp>
+        <p:nvSpPr>
+          <p:cNvPr id="2" name="TextBox 1">
+            <a:extLst>
+              <a:ext uri="{FF2B5EF4-FFF2-40B4-BE49-F238E27FC236}">
+                <a16:creationId xmlns:a16="http://schemas.microsoft.com/office/drawing/2014/main" id="{5DF106CF-89D1-049C-3FD4-88578CB84BF1}"/>
+              </a:ext>
+            </a:extLst>
+          </p:cNvPr>
+          <p:cNvSpPr txBox="1"/>
+          <p:nvPr/>
+        </p:nvSpPr>
+        <p:spPr>
+          <a:xfrm>
+            <a:off x="4344360" y="3218689"/>
+            <a:ext cx="4253087" cy="1200329"/>
+          </a:xfrm>
+          <a:prstGeom prst="rect">
+            <a:avLst/>
+          </a:prstGeom>
+          <a:noFill/>
+        </p:spPr>
+        <p:txBody>
+          <a:bodyPr wrap="none" rtlCol="0">
+            <a:spAutoFit/>
+          </a:bodyPr>
+          <a:lstStyle/>
+          <a:p>
+            <a:r>
+              <a:rPr lang="en-US" sz="7200" dirty="0">
+                <a:solidFill>
+                  <a:srgbClr val="1A1F71"/>
+                </a:solidFill>
+                <a:latin typeface="Aafia" pitchFamily="50" charset="0"/>
+              </a:rPr>
+              <a:t>LaDe</a:t>
+            </a:r>
+            <a:r>
+              <a:rPr lang="en-US" sz="7200" dirty="0">
+                <a:solidFill>
+                  <a:srgbClr val="FFD700"/>
+                </a:solidFill>
+                <a:latin typeface="Aafia" pitchFamily="50" charset="0"/>
+              </a:rPr>
+              <a:t>RR</a:t>
+            </a:r>
+          </a:p>
+        </p:txBody>
+      </p:sp>
+    </p:spTree>
+    <p:extLst>
+      <p:ext uri="{BB962C8B-B14F-4D97-AF65-F5344CB8AC3E}">
+        <p14:creationId xmlns:p14="http://schemas.microsoft.com/office/powerpoint/2010/main" val="3601117922"/>
+      </p:ext>
+    </p:extLst>
+  </p:cSld>
+  <p:clrMapOvr>
+    <a:masterClrMapping/>
+  </p:clrMapOvr>
+</p:sld>
+</file>
+
+<file path=ppt/slides/slide11.xml><?xml version="1.0" encoding="utf-8"?>
+<p:sld xmlns:a="http://schemas.openxmlformats.org/drawingml/2006/main" xmlns:r="http://schemas.openxmlformats.org/officeDocument/2006/relationships" xmlns:p="http://schemas.openxmlformats.org/presentationml/2006/main">
+  <p:cSld>
+    <p:spTree>
+      <p:nvGrpSpPr>
+        <p:cNvPr id="1" name=""/>
+        <p:cNvGrpSpPr/>
+        <p:nvPr/>
+      </p:nvGrpSpPr>
+      <p:grpSpPr>
+        <a:xfrm>
+          <a:off x="0" y="0"/>
+          <a:ext cx="0" cy="0"/>
+          <a:chOff x="0" y="0"/>
+          <a:chExt cx="0" cy="0"/>
+        </a:xfrm>
+      </p:grpSpPr>
+      <p:grpSp>
+        <p:nvGrpSpPr>
           <p:cNvPr id="3" name="Group 2">
             <a:extLst>
               <a:ext uri="{FF2B5EF4-FFF2-40B4-BE49-F238E27FC236}">
@@ -4749,6 +5006,398 @@
           <a:ln w="3175">
             <a:noFill/>
           </a:ln>
+          <a:effectLst>
+            <a:outerShdw blurRad="76200" dist="12700" dir="8100000" sy="-23000" kx="800400" algn="br" rotWithShape="0">
+              <a:prstClr val="black">
+                <a:alpha val="5000"/>
+              </a:prstClr>
+            </a:outerShdw>
+          </a:effectLst>
+          <a:scene3d>
+            <a:camera prst="orthographicFront"/>
+            <a:lightRig rig="threePt" dir="t"/>
+          </a:scene3d>
+          <a:sp3d>
+            <a:bevelT w="38100" h="38100"/>
+          </a:sp3d>
+        </p:spPr>
+        <p:style>
+          <a:lnRef idx="2">
+            <a:schemeClr val="accent1">
+              <a:shade val="15000"/>
+            </a:schemeClr>
+          </a:lnRef>
+          <a:fillRef idx="1">
+            <a:schemeClr val="accent1"/>
+          </a:fillRef>
+          <a:effectRef idx="0">
+            <a:schemeClr val="accent1"/>
+          </a:effectRef>
+          <a:fontRef idx="minor">
+            <a:schemeClr val="lt1"/>
+          </a:fontRef>
+        </p:style>
+        <p:txBody>
+          <a:bodyPr rtlCol="0" anchor="ctr"/>
+          <a:lstStyle/>
+          <a:p>
+            <a:pPr algn="ctr"/>
+            <a:endParaRPr lang="en-150">
+              <a:solidFill>
+                <a:srgbClr val="1A1F71"/>
+              </a:solidFill>
+            </a:endParaRPr>
+          </a:p>
+        </p:txBody>
+      </p:sp>
+      <p:sp>
+        <p:nvSpPr>
+          <p:cNvPr id="5" name="Rectangle 4">
+            <a:extLst>
+              <a:ext uri="{FF2B5EF4-FFF2-40B4-BE49-F238E27FC236}">
+                <a16:creationId xmlns:a16="http://schemas.microsoft.com/office/drawing/2014/main" id="{C77BE717-C333-AA2E-AE01-211F68893DDE}"/>
+              </a:ext>
+            </a:extLst>
+          </p:cNvPr>
+          <p:cNvSpPr/>
+          <p:nvPr/>
+        </p:nvSpPr>
+        <p:spPr>
+          <a:xfrm>
+            <a:off x="5440432" y="2981377"/>
+            <a:ext cx="1369714" cy="344274"/>
+          </a:xfrm>
+          <a:prstGeom prst="rect">
+            <a:avLst/>
+          </a:prstGeom>
+          <a:solidFill>
+            <a:srgbClr val="1A1F71"/>
+          </a:solidFill>
+          <a:ln w="3175">
+            <a:noFill/>
+          </a:ln>
+          <a:effectLst>
+            <a:outerShdw blurRad="76200" dist="12700" dir="8100000" sy="-23000" kx="800400" algn="br" rotWithShape="0">
+              <a:prstClr val="black">
+                <a:alpha val="5000"/>
+              </a:prstClr>
+            </a:outerShdw>
+          </a:effectLst>
+          <a:scene3d>
+            <a:camera prst="orthographicFront"/>
+            <a:lightRig rig="threePt" dir="t"/>
+          </a:scene3d>
+          <a:sp3d>
+            <a:bevelT w="38100" h="38100"/>
+          </a:sp3d>
+        </p:spPr>
+        <p:style>
+          <a:lnRef idx="2">
+            <a:schemeClr val="accent1">
+              <a:shade val="15000"/>
+            </a:schemeClr>
+          </a:lnRef>
+          <a:fillRef idx="1">
+            <a:schemeClr val="accent1"/>
+          </a:fillRef>
+          <a:effectRef idx="0">
+            <a:schemeClr val="accent1"/>
+          </a:effectRef>
+          <a:fontRef idx="minor">
+            <a:schemeClr val="lt1"/>
+          </a:fontRef>
+        </p:style>
+        <p:txBody>
+          <a:bodyPr rtlCol="0" anchor="ctr"/>
+          <a:lstStyle/>
+          <a:p>
+            <a:pPr algn="ctr"/>
+            <a:endParaRPr lang="en-150">
+              <a:solidFill>
+                <a:srgbClr val="1A1F71"/>
+              </a:solidFill>
+            </a:endParaRPr>
+          </a:p>
+        </p:txBody>
+      </p:sp>
+      <p:sp>
+        <p:nvSpPr>
+          <p:cNvPr id="6" name="Rectangle 5">
+            <a:extLst>
+              <a:ext uri="{FF2B5EF4-FFF2-40B4-BE49-F238E27FC236}">
+                <a16:creationId xmlns:a16="http://schemas.microsoft.com/office/drawing/2014/main" id="{0F3EA294-0FAE-D6B7-F4F6-0E3492015699}"/>
+              </a:ext>
+            </a:extLst>
+          </p:cNvPr>
+          <p:cNvSpPr/>
+          <p:nvPr/>
+        </p:nvSpPr>
+        <p:spPr>
+          <a:xfrm>
+            <a:off x="6732679" y="2540482"/>
+            <a:ext cx="1369711" cy="344274"/>
+          </a:xfrm>
+          <a:prstGeom prst="rect">
+            <a:avLst/>
+          </a:prstGeom>
+          <a:solidFill>
+            <a:srgbClr val="FFD700"/>
+          </a:solidFill>
+          <a:ln w="3175">
+            <a:noFill/>
+          </a:ln>
+          <a:effectLst>
+            <a:outerShdw blurRad="76200" dist="12700" dir="8100000" sy="-23000" kx="800400" algn="br" rotWithShape="0">
+              <a:prstClr val="black">
+                <a:alpha val="5000"/>
+              </a:prstClr>
+            </a:outerShdw>
+          </a:effectLst>
+          <a:scene3d>
+            <a:camera prst="orthographicFront"/>
+            <a:lightRig rig="threePt" dir="t"/>
+          </a:scene3d>
+          <a:sp3d>
+            <a:bevelT w="38100" h="38100"/>
+          </a:sp3d>
+        </p:spPr>
+        <p:style>
+          <a:lnRef idx="2">
+            <a:schemeClr val="accent1">
+              <a:shade val="15000"/>
+            </a:schemeClr>
+          </a:lnRef>
+          <a:fillRef idx="1">
+            <a:schemeClr val="accent1"/>
+          </a:fillRef>
+          <a:effectRef idx="0">
+            <a:schemeClr val="accent1"/>
+          </a:effectRef>
+          <a:fontRef idx="minor">
+            <a:schemeClr val="lt1"/>
+          </a:fontRef>
+        </p:style>
+        <p:txBody>
+          <a:bodyPr rtlCol="0" anchor="ctr"/>
+          <a:lstStyle/>
+          <a:p>
+            <a:pPr algn="ctr"/>
+            <a:endParaRPr lang="en-150"/>
+          </a:p>
+        </p:txBody>
+      </p:sp>
+      <p:sp>
+        <p:nvSpPr>
+          <p:cNvPr id="9" name="TextBox 8">
+            <a:extLst>
+              <a:ext uri="{FF2B5EF4-FFF2-40B4-BE49-F238E27FC236}">
+                <a16:creationId xmlns:a16="http://schemas.microsoft.com/office/drawing/2014/main" id="{C4A505D0-0167-DE42-F11E-1D8999064CCB}"/>
+              </a:ext>
+            </a:extLst>
+          </p:cNvPr>
+          <p:cNvSpPr txBox="1"/>
+          <p:nvPr/>
+        </p:nvSpPr>
+        <p:spPr>
+          <a:xfrm>
+            <a:off x="4009489" y="3766546"/>
+            <a:ext cx="4253087" cy="1200329"/>
+          </a:xfrm>
+          <a:prstGeom prst="rect">
+            <a:avLst/>
+          </a:prstGeom>
+          <a:noFill/>
+          <a:ln>
+            <a:noFill/>
+          </a:ln>
+          <a:effectLst>
+            <a:outerShdw blurRad="76200" dist="12700" dir="8100000" sy="-23000" kx="800400" algn="br" rotWithShape="0">
+              <a:prstClr val="black">
+                <a:alpha val="20000"/>
+              </a:prstClr>
+            </a:outerShdw>
+          </a:effectLst>
+        </p:spPr>
+        <p:txBody>
+          <a:bodyPr wrap="none" rtlCol="0">
+            <a:spAutoFit/>
+            <a:scene3d>
+              <a:camera prst="orthographicFront"/>
+              <a:lightRig rig="threePt" dir="t"/>
+            </a:scene3d>
+            <a:sp3d extrusionH="38100">
+              <a:bevelT w="38100" h="38100"/>
+            </a:sp3d>
+          </a:bodyPr>
+          <a:lstStyle/>
+          <a:p>
+            <a:r>
+              <a:rPr lang="en-US" sz="7200" dirty="0">
+                <a:ln w="3175">
+                  <a:noFill/>
+                </a:ln>
+                <a:solidFill>
+                  <a:srgbClr val="1A1F71"/>
+                </a:solidFill>
+                <a:effectLst>
+                  <a:outerShdw blurRad="50800" dist="50800" dir="7200000" algn="ctr" rotWithShape="0">
+                    <a:schemeClr val="tx1">
+                      <a:alpha val="5000"/>
+                    </a:schemeClr>
+                  </a:outerShdw>
+                </a:effectLst>
+                <a:latin typeface="Aafia" pitchFamily="50" charset="0"/>
+              </a:rPr>
+              <a:t>LaDe</a:t>
+            </a:r>
+            <a:r>
+              <a:rPr lang="en-US" sz="7200" dirty="0">
+                <a:ln w="3175">
+                  <a:noFill/>
+                </a:ln>
+                <a:gradFill flip="none" rotWithShape="1">
+                  <a:gsLst>
+                    <a:gs pos="80000">
+                      <a:srgbClr val="FFD700"/>
+                    </a:gs>
+                    <a:gs pos="0">
+                      <a:srgbClr val="FFD700"/>
+                    </a:gs>
+                    <a:gs pos="100000">
+                      <a:schemeClr val="bg1"/>
+                    </a:gs>
+                  </a:gsLst>
+                  <a:lin ang="18900000" scaled="1"/>
+                  <a:tileRect/>
+                </a:gradFill>
+                <a:effectLst>
+                  <a:outerShdw blurRad="50800" dist="50800" dir="7200000" algn="ctr" rotWithShape="0">
+                    <a:schemeClr val="tx1">
+                      <a:alpha val="5000"/>
+                    </a:schemeClr>
+                  </a:outerShdw>
+                </a:effectLst>
+                <a:latin typeface="Aafia" pitchFamily="50" charset="0"/>
+              </a:rPr>
+              <a:t>RR</a:t>
+            </a:r>
+          </a:p>
+        </p:txBody>
+      </p:sp>
+      <p:sp>
+        <p:nvSpPr>
+          <p:cNvPr id="3" name="TextBox 2">
+            <a:extLst>
+              <a:ext uri="{FF2B5EF4-FFF2-40B4-BE49-F238E27FC236}">
+                <a16:creationId xmlns:a16="http://schemas.microsoft.com/office/drawing/2014/main" id="{61F49C8A-697E-66B4-489E-AA7D4C7F18F2}"/>
+              </a:ext>
+            </a:extLst>
+          </p:cNvPr>
+          <p:cNvSpPr txBox="1"/>
+          <p:nvPr/>
+        </p:nvSpPr>
+        <p:spPr>
+          <a:xfrm>
+            <a:off x="6825504" y="3987710"/>
+            <a:ext cx="2812272" cy="1323439"/>
+          </a:xfrm>
+          <a:prstGeom prst="rect">
+            <a:avLst/>
+          </a:prstGeom>
+          <a:noFill/>
+        </p:spPr>
+        <p:txBody>
+          <a:bodyPr wrap="square" rtlCol="0">
+            <a:spAutoFit/>
+            <a:scene3d>
+              <a:camera prst="isometricRightUp"/>
+              <a:lightRig rig="threePt" dir="t"/>
+            </a:scene3d>
+          </a:bodyPr>
+          <a:lstStyle/>
+          <a:p>
+            <a:r>
+              <a:rPr lang="en-US" sz="8000" b="1" dirty="0">
+                <a:ln w="19050">
+                  <a:noFill/>
+                </a:ln>
+                <a:solidFill>
+                  <a:srgbClr val="FE02EC"/>
+                </a:solidFill>
+                <a:latin typeface="always  forever" pitchFamily="2" charset="0"/>
+                <a:cs typeface="Libertinus Keyboard" pitchFamily="50" charset="-79"/>
+              </a:rPr>
+              <a:t>Python Lib</a:t>
+            </a:r>
+            <a:endParaRPr lang="en-150" sz="8000" b="1" dirty="0">
+              <a:ln w="19050">
+                <a:noFill/>
+              </a:ln>
+              <a:solidFill>
+                <a:srgbClr val="FE02EC"/>
+              </a:solidFill>
+              <a:latin typeface="always  forever" pitchFamily="2" charset="0"/>
+              <a:cs typeface="Libertinus Keyboard" pitchFamily="50" charset="-79"/>
+            </a:endParaRPr>
+          </a:p>
+        </p:txBody>
+      </p:sp>
+    </p:spTree>
+    <p:extLst>
+      <p:ext uri="{BB962C8B-B14F-4D97-AF65-F5344CB8AC3E}">
+        <p14:creationId xmlns:p14="http://schemas.microsoft.com/office/powerpoint/2010/main" val="2648620447"/>
+      </p:ext>
+    </p:extLst>
+  </p:cSld>
+  <p:clrMapOvr>
+    <a:masterClrMapping/>
+  </p:clrMapOvr>
+</p:sld>
+</file>
+
+<file path=ppt/slides/slide4.xml><?xml version="1.0" encoding="utf-8"?>
+<p:sld xmlns:a="http://schemas.openxmlformats.org/drawingml/2006/main" xmlns:r="http://schemas.openxmlformats.org/officeDocument/2006/relationships" xmlns:p="http://schemas.openxmlformats.org/presentationml/2006/main">
+  <p:cSld>
+    <p:spTree>
+      <p:nvGrpSpPr>
+        <p:cNvPr id="1" name=""/>
+        <p:cNvGrpSpPr/>
+        <p:nvPr/>
+      </p:nvGrpSpPr>
+      <p:grpSpPr>
+        <a:xfrm>
+          <a:off x="0" y="0"/>
+          <a:ext cx="0" cy="0"/>
+          <a:chOff x="0" y="0"/>
+          <a:chExt cx="0" cy="0"/>
+        </a:xfrm>
+      </p:grpSpPr>
+      <p:sp>
+        <p:nvSpPr>
+          <p:cNvPr id="4" name="Rectangle 3">
+            <a:extLst>
+              <a:ext uri="{FF2B5EF4-FFF2-40B4-BE49-F238E27FC236}">
+                <a16:creationId xmlns:a16="http://schemas.microsoft.com/office/drawing/2014/main" id="{0EA7F422-11B4-801C-3967-BC77A3C5E938}"/>
+              </a:ext>
+            </a:extLst>
+          </p:cNvPr>
+          <p:cNvSpPr/>
+          <p:nvPr/>
+        </p:nvSpPr>
+        <p:spPr>
+          <a:xfrm>
+            <a:off x="4148185" y="3422272"/>
+            <a:ext cx="1369714" cy="344274"/>
+          </a:xfrm>
+          <a:prstGeom prst="rect">
+            <a:avLst/>
+          </a:prstGeom>
+          <a:solidFill>
+            <a:srgbClr val="1A1F71"/>
+          </a:solidFill>
+          <a:ln w="3175">
+            <a:noFill/>
+          </a:ln>
           <a:scene3d>
             <a:camera prst="orthographicFront"/>
             <a:lightRig rig="threePt" dir="t"/>
@@ -4986,7 +5635,7 @@
 </p:sld>
 </file>
 
-<file path=ppt/slides/slide4.xml><?xml version="1.0" encoding="utf-8"?>
+<file path=ppt/slides/slide5.xml><?xml version="1.0" encoding="utf-8"?>
 <p:sld xmlns:a="http://schemas.openxmlformats.org/drawingml/2006/main" xmlns:r="http://schemas.openxmlformats.org/officeDocument/2006/relationships" xmlns:p="http://schemas.openxmlformats.org/presentationml/2006/main">
   <p:cSld>
     <p:spTree>
@@ -5258,7 +5907,7 @@
 </p:sld>
 </file>
 
-<file path=ppt/slides/slide5.xml><?xml version="1.0" encoding="utf-8"?>
+<file path=ppt/slides/slide6.xml><?xml version="1.0" encoding="utf-8"?>
 <p:sld xmlns:a="http://schemas.openxmlformats.org/drawingml/2006/main" xmlns:r="http://schemas.openxmlformats.org/officeDocument/2006/relationships" xmlns:p="http://schemas.openxmlformats.org/presentationml/2006/main">
   <p:cSld>
     <p:spTree>
@@ -5508,7 +6157,7 @@
 </p:sld>
 </file>
 
-<file path=ppt/slides/slide6.xml><?xml version="1.0" encoding="utf-8"?>
+<file path=ppt/slides/slide7.xml><?xml version="1.0" encoding="utf-8"?>
 <p:sld xmlns:a="http://schemas.openxmlformats.org/drawingml/2006/main" xmlns:r="http://schemas.openxmlformats.org/officeDocument/2006/relationships" xmlns:p="http://schemas.openxmlformats.org/presentationml/2006/main">
   <p:cSld>
     <p:spTree>
@@ -5942,7 +6591,7 @@
 </p:sld>
 </file>
 
-<file path=ppt/slides/slide7.xml><?xml version="1.0" encoding="utf-8"?>
+<file path=ppt/slides/slide8.xml><?xml version="1.0" encoding="utf-8"?>
 <p:sld xmlns:a="http://schemas.openxmlformats.org/drawingml/2006/main" xmlns:r="http://schemas.openxmlformats.org/officeDocument/2006/relationships" xmlns:p="http://schemas.openxmlformats.org/presentationml/2006/main">
   <p:cSld>
     <p:spTree>
@@ -6198,7 +6847,7 @@
 </p:sld>
 </file>
 
-<file path=ppt/slides/slide8.xml><?xml version="1.0" encoding="utf-8"?>
+<file path=ppt/slides/slide9.xml><?xml version="1.0" encoding="utf-8"?>
 <p:sld xmlns:a="http://schemas.openxmlformats.org/drawingml/2006/main" xmlns:r="http://schemas.openxmlformats.org/officeDocument/2006/relationships" xmlns:p="http://schemas.openxmlformats.org/presentationml/2006/main">
   <p:cSld>
     <p:spTree>
@@ -6445,262 +7094,6 @@
     <p:extLst>
       <p:ext uri="{BB962C8B-B14F-4D97-AF65-F5344CB8AC3E}">
         <p14:creationId xmlns:p14="http://schemas.microsoft.com/office/powerpoint/2010/main" val="2663385008"/>
-      </p:ext>
-    </p:extLst>
-  </p:cSld>
-  <p:clrMapOvr>
-    <a:masterClrMapping/>
-  </p:clrMapOvr>
-</p:sld>
-</file>
-
-<file path=ppt/slides/slide9.xml><?xml version="1.0" encoding="utf-8"?>
-<p:sld xmlns:a="http://schemas.openxmlformats.org/drawingml/2006/main" xmlns:r="http://schemas.openxmlformats.org/officeDocument/2006/relationships" xmlns:p="http://schemas.openxmlformats.org/presentationml/2006/main">
-  <p:cSld>
-    <p:spTree>
-      <p:nvGrpSpPr>
-        <p:cNvPr id="1" name=""/>
-        <p:cNvGrpSpPr/>
-        <p:nvPr/>
-      </p:nvGrpSpPr>
-      <p:grpSpPr>
-        <a:xfrm>
-          <a:off x="0" y="0"/>
-          <a:ext cx="0" cy="0"/>
-          <a:chOff x="0" y="0"/>
-          <a:chExt cx="0" cy="0"/>
-        </a:xfrm>
-      </p:grpSpPr>
-      <p:grpSp>
-        <p:nvGrpSpPr>
-          <p:cNvPr id="9" name="Group 8">
-            <a:extLst>
-              <a:ext uri="{FF2B5EF4-FFF2-40B4-BE49-F238E27FC236}">
-                <a16:creationId xmlns:a16="http://schemas.microsoft.com/office/drawing/2014/main" id="{2590A2DE-16F5-44B0-79F7-D9518568AB64}"/>
-              </a:ext>
-            </a:extLst>
-          </p:cNvPr>
-          <p:cNvGrpSpPr/>
-          <p:nvPr/>
-        </p:nvGrpSpPr>
-        <p:grpSpPr>
-          <a:xfrm>
-            <a:off x="4468368" y="1625169"/>
-            <a:ext cx="3959748" cy="1566088"/>
-            <a:chOff x="4468368" y="1563624"/>
-            <a:chExt cx="4531517" cy="1792224"/>
-          </a:xfrm>
-        </p:grpSpPr>
-        <p:sp>
-          <p:nvSpPr>
-            <p:cNvPr id="6" name="Rectangle 5">
-              <a:extLst>
-                <a:ext uri="{FF2B5EF4-FFF2-40B4-BE49-F238E27FC236}">
-                  <a16:creationId xmlns:a16="http://schemas.microsoft.com/office/drawing/2014/main" id="{011E5DD6-E9CE-0E04-DAAC-92581C64AEF3}"/>
-                </a:ext>
-              </a:extLst>
-            </p:cNvPr>
-            <p:cNvSpPr/>
-            <p:nvPr/>
-          </p:nvSpPr>
-          <p:spPr>
-            <a:xfrm>
-              <a:off x="4468368" y="2990088"/>
-              <a:ext cx="1627632" cy="365760"/>
-            </a:xfrm>
-            <a:prstGeom prst="rect">
-              <a:avLst/>
-            </a:prstGeom>
-            <a:solidFill>
-              <a:srgbClr val="1A1F71"/>
-            </a:solidFill>
-            <a:ln>
-              <a:noFill/>
-            </a:ln>
-          </p:spPr>
-          <p:style>
-            <a:lnRef idx="2">
-              <a:schemeClr val="accent1">
-                <a:shade val="15000"/>
-              </a:schemeClr>
-            </a:lnRef>
-            <a:fillRef idx="1">
-              <a:schemeClr val="accent1"/>
-            </a:fillRef>
-            <a:effectRef idx="0">
-              <a:schemeClr val="accent1"/>
-            </a:effectRef>
-            <a:fontRef idx="minor">
-              <a:schemeClr val="lt1"/>
-            </a:fontRef>
-          </p:style>
-          <p:txBody>
-            <a:bodyPr rtlCol="0" anchor="ctr"/>
-            <a:lstStyle/>
-            <a:p>
-              <a:pPr algn="ctr"/>
-              <a:endParaRPr lang="en-150"/>
-            </a:p>
-          </p:txBody>
-        </p:sp>
-        <p:sp>
-          <p:nvSpPr>
-            <p:cNvPr id="7" name="Rectangle 6">
-              <a:extLst>
-                <a:ext uri="{FF2B5EF4-FFF2-40B4-BE49-F238E27FC236}">
-                  <a16:creationId xmlns:a16="http://schemas.microsoft.com/office/drawing/2014/main" id="{4E011A50-3FA0-A8E8-8DF5-1CBB2DF4C4FE}"/>
-                </a:ext>
-              </a:extLst>
-            </p:cNvPr>
-            <p:cNvSpPr/>
-            <p:nvPr/>
-          </p:nvSpPr>
-          <p:spPr>
-            <a:xfrm>
-              <a:off x="5920312" y="2276856"/>
-              <a:ext cx="1627632" cy="365760"/>
-            </a:xfrm>
-            <a:prstGeom prst="rect">
-              <a:avLst/>
-            </a:prstGeom>
-            <a:solidFill>
-              <a:srgbClr val="1A1F71"/>
-            </a:solidFill>
-            <a:ln>
-              <a:noFill/>
-            </a:ln>
-          </p:spPr>
-          <p:style>
-            <a:lnRef idx="2">
-              <a:schemeClr val="accent1">
-                <a:shade val="15000"/>
-              </a:schemeClr>
-            </a:lnRef>
-            <a:fillRef idx="1">
-              <a:schemeClr val="accent1"/>
-            </a:fillRef>
-            <a:effectRef idx="0">
-              <a:schemeClr val="accent1"/>
-            </a:effectRef>
-            <a:fontRef idx="minor">
-              <a:schemeClr val="lt1"/>
-            </a:fontRef>
-          </p:style>
-          <p:txBody>
-            <a:bodyPr rtlCol="0" anchor="ctr"/>
-            <a:lstStyle/>
-            <a:p>
-              <a:pPr algn="ctr"/>
-              <a:endParaRPr lang="en-150"/>
-            </a:p>
-          </p:txBody>
-        </p:sp>
-        <p:sp>
-          <p:nvSpPr>
-            <p:cNvPr id="8" name="Rectangle 7">
-              <a:extLst>
-                <a:ext uri="{FF2B5EF4-FFF2-40B4-BE49-F238E27FC236}">
-                  <a16:creationId xmlns:a16="http://schemas.microsoft.com/office/drawing/2014/main" id="{78B4BDD1-236D-438B-09EB-97CA895C3300}"/>
-                </a:ext>
-              </a:extLst>
-            </p:cNvPr>
-            <p:cNvSpPr/>
-            <p:nvPr/>
-          </p:nvSpPr>
-          <p:spPr>
-            <a:xfrm>
-              <a:off x="7372256" y="1563624"/>
-              <a:ext cx="1627629" cy="365760"/>
-            </a:xfrm>
-            <a:prstGeom prst="rect">
-              <a:avLst/>
-            </a:prstGeom>
-            <a:solidFill>
-              <a:srgbClr val="FFD700"/>
-            </a:solidFill>
-            <a:ln>
-              <a:noFill/>
-            </a:ln>
-          </p:spPr>
-          <p:style>
-            <a:lnRef idx="2">
-              <a:schemeClr val="accent1">
-                <a:shade val="15000"/>
-              </a:schemeClr>
-            </a:lnRef>
-            <a:fillRef idx="1">
-              <a:schemeClr val="accent1"/>
-            </a:fillRef>
-            <a:effectRef idx="0">
-              <a:schemeClr val="accent1"/>
-            </a:effectRef>
-            <a:fontRef idx="minor">
-              <a:schemeClr val="lt1"/>
-            </a:fontRef>
-          </p:style>
-          <p:txBody>
-            <a:bodyPr rtlCol="0" anchor="ctr"/>
-            <a:lstStyle/>
-            <a:p>
-              <a:pPr algn="ctr"/>
-              <a:endParaRPr lang="en-150"/>
-            </a:p>
-          </p:txBody>
-        </p:sp>
-      </p:grpSp>
-      <p:sp>
-        <p:nvSpPr>
-          <p:cNvPr id="2" name="TextBox 1">
-            <a:extLst>
-              <a:ext uri="{FF2B5EF4-FFF2-40B4-BE49-F238E27FC236}">
-                <a16:creationId xmlns:a16="http://schemas.microsoft.com/office/drawing/2014/main" id="{5DF106CF-89D1-049C-3FD4-88578CB84BF1}"/>
-              </a:ext>
-            </a:extLst>
-          </p:cNvPr>
-          <p:cNvSpPr txBox="1"/>
-          <p:nvPr/>
-        </p:nvSpPr>
-        <p:spPr>
-          <a:xfrm>
-            <a:off x="4344360" y="3218689"/>
-            <a:ext cx="4253087" cy="1200329"/>
-          </a:xfrm>
-          <a:prstGeom prst="rect">
-            <a:avLst/>
-          </a:prstGeom>
-          <a:noFill/>
-        </p:spPr>
-        <p:txBody>
-          <a:bodyPr wrap="none" rtlCol="0">
-            <a:spAutoFit/>
-          </a:bodyPr>
-          <a:lstStyle/>
-          <a:p>
-            <a:r>
-              <a:rPr lang="en-US" sz="7200" dirty="0">
-                <a:solidFill>
-                  <a:srgbClr val="1A1F71"/>
-                </a:solidFill>
-                <a:latin typeface="Aafia" pitchFamily="50" charset="0"/>
-              </a:rPr>
-              <a:t>LaDe</a:t>
-            </a:r>
-            <a:r>
-              <a:rPr lang="en-US" sz="7200" dirty="0">
-                <a:solidFill>
-                  <a:srgbClr val="FFD700"/>
-                </a:solidFill>
-                <a:latin typeface="Aafia" pitchFamily="50" charset="0"/>
-              </a:rPr>
-              <a:t>RR</a:t>
-            </a:r>
-          </a:p>
-        </p:txBody>
-      </p:sp>
-    </p:spTree>
-    <p:extLst>
-      <p:ext uri="{BB962C8B-B14F-4D97-AF65-F5344CB8AC3E}">
-        <p14:creationId xmlns:p14="http://schemas.microsoft.com/office/powerpoint/2010/main" val="3601117922"/>
       </p:ext>
     </p:extLst>
   </p:cSld>

</xml_diff>